<commit_message>
Add a template with a banner
</commit_message>
<xml_diff>
--- a/_extensions/ird/ressources/template.pptx
+++ b/_extensions/ird/ressources/template.pptx
@@ -3665,7 +3665,12 @@
             <p:ph type="dt" sz="half" idx="10"/>
           </p:nvPr>
         </p:nvSpPr>
-        <p:spPr/>
+        <p:spPr>
+          <a:xfrm>
+            <a:off x="681037" y="6356352"/>
+            <a:ext cx="1080528" cy="360000"/>
+          </a:xfrm>
+        </p:spPr>
         <p:txBody>
           <a:bodyPr/>
           <a:lstStyle/>
@@ -3701,10 +3706,7 @@
           <a:bodyPr/>
           <a:lstStyle/>
           <a:p>
-            <a:r>
-              <a:rPr lang="fr-FR"/>
-              <a:t>Menu insertion / En-tête et pied de page : pour modifier globalement + date</a:t>
-            </a:r>
+            <a:endParaRPr lang="fr-FR" dirty="0"/>
           </a:p>
         </p:txBody>
       </p:sp>
@@ -3895,7 +3897,12 @@
             <p:ph type="dt" sz="half" idx="10"/>
           </p:nvPr>
         </p:nvSpPr>
-        <p:spPr/>
+        <p:spPr>
+          <a:xfrm>
+            <a:off x="681037" y="6356352"/>
+            <a:ext cx="1080528" cy="360000"/>
+          </a:xfrm>
+        </p:spPr>
         <p:txBody>
           <a:bodyPr/>
           <a:lstStyle/>
@@ -3931,10 +3938,7 @@
           <a:bodyPr/>
           <a:lstStyle/>
           <a:p>
-            <a:r>
-              <a:rPr lang="fr-FR"/>
-              <a:t>Menu insertion / En-tête et pied de page : pour modifier globalement + date</a:t>
-            </a:r>
+            <a:endParaRPr lang="fr-FR"/>
           </a:p>
         </p:txBody>
       </p:sp>
@@ -4140,7 +4144,12 @@
             <p:ph type="dt" sz="half" idx="10"/>
           </p:nvPr>
         </p:nvSpPr>
-        <p:spPr/>
+        <p:spPr>
+          <a:xfrm>
+            <a:off x="681037" y="6356352"/>
+            <a:ext cx="1080528" cy="360000"/>
+          </a:xfrm>
+        </p:spPr>
         <p:txBody>
           <a:bodyPr/>
           <a:lstStyle/>
@@ -4175,10 +4184,7 @@
           <a:bodyPr/>
           <a:lstStyle/>
           <a:p>
-            <a:r>
-              <a:rPr lang="fr-FR"/>
-              <a:t>Menu insertion / En-tête et pied de page : pour modifier globalement + date</a:t>
-            </a:r>
+            <a:endParaRPr lang="fr-FR"/>
           </a:p>
         </p:txBody>
       </p:sp>
@@ -4475,7 +4481,12 @@
             <p:ph type="dt" sz="half" idx="10"/>
           </p:nvPr>
         </p:nvSpPr>
-        <p:spPr/>
+        <p:spPr>
+          <a:xfrm>
+            <a:off x="681037" y="6356352"/>
+            <a:ext cx="1080528" cy="360000"/>
+          </a:xfrm>
+        </p:spPr>
         <p:txBody>
           <a:bodyPr/>
           <a:lstStyle/>
@@ -4510,10 +4521,7 @@
           <a:bodyPr/>
           <a:lstStyle/>
           <a:p>
-            <a:r>
-              <a:rPr lang="fr-FR"/>
-              <a:t>Menu insertion / En-tête et pied de page : pour modifier globalement + date</a:t>
-            </a:r>
+            <a:endParaRPr lang="fr-FR"/>
           </a:p>
         </p:txBody>
       </p:sp>
@@ -4762,7 +4770,12 @@
             <p:ph type="dt" sz="half" idx="10"/>
           </p:nvPr>
         </p:nvSpPr>
-        <p:spPr/>
+        <p:spPr>
+          <a:xfrm>
+            <a:off x="681037" y="6356352"/>
+            <a:ext cx="1080528" cy="360000"/>
+          </a:xfrm>
+        </p:spPr>
         <p:txBody>
           <a:bodyPr/>
           <a:lstStyle/>
@@ -4797,10 +4810,6 @@
           <a:bodyPr/>
           <a:lstStyle/>
           <a:p>
-            <a:r>
-              <a:rPr lang="fr-FR"/>
-              <a:t>Menu insertion / En-tête et pied de page : pour modifier globalement + date</a:t>
-            </a:r>
             <a:endParaRPr lang="fr-FR" dirty="0"/>
           </a:p>
         </p:txBody>
@@ -5310,7 +5319,12 @@
             <p:ph type="dt" sz="half" idx="10"/>
           </p:nvPr>
         </p:nvSpPr>
-        <p:spPr/>
+        <p:spPr>
+          <a:xfrm>
+            <a:off x="681037" y="6356352"/>
+            <a:ext cx="1080528" cy="360000"/>
+          </a:xfrm>
+        </p:spPr>
         <p:txBody>
           <a:bodyPr/>
           <a:lstStyle/>
@@ -5345,10 +5359,7 @@
           <a:bodyPr/>
           <a:lstStyle/>
           <a:p>
-            <a:r>
-              <a:rPr lang="fr-FR"/>
-              <a:t>Menu insertion / En-tête et pied de page : pour modifier globalement + date</a:t>
-            </a:r>
+            <a:endParaRPr lang="fr-FR"/>
           </a:p>
         </p:txBody>
       </p:sp>
@@ -5447,7 +5458,12 @@
             <p:ph type="dt" sz="half" idx="10"/>
           </p:nvPr>
         </p:nvSpPr>
-        <p:spPr/>
+        <p:spPr>
+          <a:xfrm>
+            <a:off x="681037" y="6356352"/>
+            <a:ext cx="1080528" cy="360000"/>
+          </a:xfrm>
+        </p:spPr>
         <p:txBody>
           <a:bodyPr/>
           <a:lstStyle/>
@@ -5483,10 +5499,7 @@
           <a:bodyPr/>
           <a:lstStyle/>
           <a:p>
-            <a:r>
-              <a:rPr lang="fr-FR"/>
-              <a:t>Menu insertion / En-tête et pied de page : pour modifier globalement + date</a:t>
-            </a:r>
+            <a:endParaRPr lang="fr-FR"/>
           </a:p>
         </p:txBody>
       </p:sp>
@@ -5664,7 +5677,12 @@
             <p:ph type="dt" sz="half" idx="10"/>
           </p:nvPr>
         </p:nvSpPr>
-        <p:spPr/>
+        <p:spPr>
+          <a:xfrm>
+            <a:off x="681037" y="6356352"/>
+            <a:ext cx="1080528" cy="360000"/>
+          </a:xfrm>
+        </p:spPr>
         <p:txBody>
           <a:bodyPr/>
           <a:lstStyle/>
@@ -5699,10 +5717,7 @@
           <a:bodyPr/>
           <a:lstStyle/>
           <a:p>
-            <a:r>
-              <a:rPr lang="fr-FR"/>
-              <a:t>Menu insertion / En-tête et pied de page : pour modifier globalement + date</a:t>
-            </a:r>
+            <a:endParaRPr lang="fr-FR"/>
           </a:p>
         </p:txBody>
       </p:sp>
@@ -7670,10 +7685,7 @@
           <a:bodyPr/>
           <a:lstStyle/>
           <a:p>
-            <a:r>
-              <a:rPr lang="fr-FR"/>
-              <a:t>Menu insertion / En-tête et pied de page : pour modifier globalement + date</a:t>
-            </a:r>
+            <a:endParaRPr lang="fr-FR"/>
           </a:p>
         </p:txBody>
       </p:sp>
@@ -7949,10 +7961,7 @@
           <a:bodyPr/>
           <a:lstStyle/>
           <a:p>
-            <a:r>
-              <a:rPr lang="fr-FR"/>
-              <a:t>Menu insertion / En-tête et pied de page : pour modifier globalement + date</a:t>
-            </a:r>
+            <a:endParaRPr lang="fr-FR"/>
           </a:p>
         </p:txBody>
       </p:sp>

</xml_diff>